<commit_message>
Added getUi and getCode function to deal with different requests; Updated documents;
</commit_message>
<xml_diff>
--- a/docs/VMC Hackathon 2024 - VMC.Chatbot - Demo.pptx
+++ b/docs/VMC Hackathon 2024 - VMC.Chatbot - Demo.pptx
@@ -289,7 +289,7 @@
               <a:pPr>
                 <a:defRPr/>
               </a:pPr>
-              <a:t>5/28/2024</a:t>
+              <a:t>5/29/2024</a:t>
             </a:fld>
             <a:endParaRPr lang="en-US"/>
           </a:p>
@@ -535,7 +535,7 @@
               <a:pPr>
                 <a:defRPr/>
               </a:pPr>
-              <a:t>5/28/2024</a:t>
+              <a:t>5/29/2024</a:t>
             </a:fld>
             <a:endParaRPr lang="en-US"/>
           </a:p>
@@ -43916,7 +43916,7 @@
             </a:pPr>
             <a:fld id="{FB89F83D-D94F-4E45-A8B2-6C514902A01F}" type="datetime1">
               <a:rPr lang="de-DE" smtClean="0"/>
-              <a:t>28.05.2024</a:t>
+              <a:t>29.05.2024</a:t>
             </a:fld>
             <a:endParaRPr lang="de-DE" dirty="0"/>
           </a:p>
@@ -46865,7 +46865,29 @@
                   <a:srgbClr val="FFFFFF"/>
                 </a:highlight>
               </a:rPr>
-              <a:t>I want to query Knowledge Database to show scripts FS SF</a:t>
+              <a:t>I want to query Knowledge Database to show scripts </a:t>
+            </a:r>
+            <a:r>
+              <a:rPr lang="en-US" dirty="0">
+                <a:solidFill>
+                  <a:srgbClr val="FF0000"/>
+                </a:solidFill>
+                <a:highlight>
+                  <a:srgbClr val="FFFFFF"/>
+                </a:highlight>
+              </a:rPr>
+              <a:t>FS</a:t>
+            </a:r>
+            <a:r>
+              <a:rPr lang="en-US" dirty="0">
+                <a:solidFill>
+                  <a:schemeClr val="tx1"/>
+                </a:solidFill>
+                <a:highlight>
+                  <a:srgbClr val="FFFFFF"/>
+                </a:highlight>
+              </a:rPr>
+              <a:t> SF</a:t>
             </a:r>
           </a:p>
           <a:p>
@@ -46891,7 +46913,29 @@
                   <a:srgbClr val="FFFFFF"/>
                 </a:highlight>
               </a:rPr>
-              <a:t>I want to run script directly from the viewer FS </a:t>
+              <a:t>I want to copy script directly from the viewer </a:t>
+            </a:r>
+            <a:r>
+              <a:rPr lang="en-US" dirty="0">
+                <a:solidFill>
+                  <a:srgbClr val="FF0000"/>
+                </a:solidFill>
+                <a:highlight>
+                  <a:srgbClr val="FFFFFF"/>
+                </a:highlight>
+              </a:rPr>
+              <a:t>FS</a:t>
+            </a:r>
+            <a:r>
+              <a:rPr lang="en-US" dirty="0">
+                <a:solidFill>
+                  <a:schemeClr val="tx1"/>
+                </a:solidFill>
+                <a:highlight>
+                  <a:srgbClr val="FFFFFF"/>
+                </a:highlight>
+              </a:rPr>
+              <a:t> </a:t>
             </a:r>
             <a:r>
               <a:rPr lang="en-US" dirty="0">
@@ -47978,14 +48022,34 @@
           <a:p>
             <a:r>
               <a:rPr lang="en-CA" dirty="0"/>
-              <a:t>Can Azure Language Cognitive Service well understand my script examples and generate script for me?</a:t>
+              <a:t>Can Azure Language Cognitive Service learn from my script examples and generate script for me?</a:t>
             </a:r>
           </a:p>
           <a:p>
             <a:pPr lvl="1"/>
             <a:r>
               <a:rPr lang="en-CA" dirty="0"/>
-              <a:t>Promising with connections to Generative AI services</a:t>
+              <a:t>No, it’s not meant for code understanding and generation.</a:t>
+            </a:r>
+          </a:p>
+          <a:p>
+            <a:r>
+              <a:rPr lang="en-CA" dirty="0"/>
+              <a:t>What’s the advantages of using chatbot instead of searching documents?</a:t>
+            </a:r>
+          </a:p>
+          <a:p>
+            <a:pPr lvl="1"/>
+            <a:r>
+              <a:rPr lang="en-CA" dirty="0"/>
+              <a:t>Searching documents: context unaware / multiple results without ranking</a:t>
+            </a:r>
+          </a:p>
+          <a:p>
+            <a:pPr lvl="1"/>
+            <a:r>
+              <a:rPr lang="en-CA" dirty="0"/>
+              <a:t>Using chatbot: context aware / responses based on confidence level</a:t>
             </a:r>
           </a:p>
           <a:p>
@@ -48063,19 +48127,6 @@
             <a:r>
               <a:rPr lang="en-CA" dirty="0"/>
               <a:t>EC: anything we want</a:t>
-            </a:r>
-          </a:p>
-          <a:p>
-            <a:r>
-              <a:rPr lang="en-CA" dirty="0"/>
-              <a:t>Why choose Microsoft Azure, not AWS, Google AI or other service providers?</a:t>
-            </a:r>
-          </a:p>
-          <a:p>
-            <a:pPr lvl="1"/>
-            <a:r>
-              <a:rPr lang="en-CA" dirty="0"/>
-              <a:t>We have subscriptions with Microsoft Azure</a:t>
             </a:r>
           </a:p>
           <a:p>
@@ -48200,6 +48251,19 @@
           <a:lstStyle/>
           <a:p>
             <a:r>
+              <a:rPr lang="en-CA" dirty="0"/>
+              <a:t>Why choose Microsoft Azure, not AWS, Google AI or other service providers?</a:t>
+            </a:r>
+          </a:p>
+          <a:p>
+            <a:pPr lvl="1"/>
+            <a:r>
+              <a:rPr lang="en-CA" dirty="0"/>
+              <a:t>We have subscriptions with Microsoft Azure</a:t>
+            </a:r>
+          </a:p>
+          <a:p>
+            <a:r>
               <a:rPr lang="en-US" dirty="0"/>
               <a:t>Is that safe to let Azure Language Cognitive Service to digest my documents and scripts?</a:t>
             </a:r>
@@ -48246,9 +48310,10 @@
           <a:p>
             <a:pPr lvl="1"/>
             <a:r>
-              <a:rPr lang="en-US" dirty="0"/>
-              <a:t>Not at all</a:t>
-            </a:r>
+              <a:rPr lang="en-US"/>
+              <a:t>No</a:t>
+            </a:r>
+            <a:endParaRPr lang="en-US" dirty="0"/>
           </a:p>
           <a:p>
             <a:r>
@@ -49594,6 +49659,21 @@
 </file>
 
 <file path=customXml/item1.xml><?xml version="1.0" encoding="utf-8"?>
+<p:properties xmlns:p="http://schemas.microsoft.com/office/2006/metadata/properties" xmlns:xsi="http://www.w3.org/2001/XMLSchema-instance" xmlns:pc="http://schemas.microsoft.com/office/infopath/2007/PartnerControls">
+  <documentManagement/>
+</p:properties>
+</file>
+
+<file path=customXml/item2.xml><?xml version="1.0" encoding="utf-8"?>
+<?mso-contentType ?>
+<FormTemplates xmlns="http://schemas.microsoft.com/sharepoint/v3/contenttype/forms">
+  <Display>DocumentLibraryForm</Display>
+  <Edit>DocumentLibraryForm</Edit>
+  <New>DocumentLibraryForm</New>
+</FormTemplates>
+</file>
+
+<file path=customXml/item3.xml><?xml version="1.0" encoding="utf-8"?>
 <ct:contentTypeSchema xmlns:ct="http://schemas.microsoft.com/office/2006/metadata/contentType" xmlns:ma="http://schemas.microsoft.com/office/2006/metadata/properties/metaAttributes" ct:_="" ma:_="" ma:contentTypeName="Dokument" ma:contentTypeID="0x010100610F89A0BBA6C34A913DB646AC567109" ma:contentTypeVersion="12" ma:contentTypeDescription="Ein neues Dokument erstellen." ma:contentTypeScope="" ma:versionID="b3371b258f4be0ddf951ea065973cc30">
   <xsd:schema xmlns:xsd="http://www.w3.org/2001/XMLSchema" xmlns:xs="http://www.w3.org/2001/XMLSchema" xmlns:p="http://schemas.microsoft.com/office/2006/metadata/properties" xmlns:ns2="1f6a6638-2655-4a74-b9f8-16c1b5edccac" xmlns:ns3="bf34d6df-5183-4f9f-a1bd-e8af6fdd30b8" targetNamespace="http://schemas.microsoft.com/office/2006/metadata/properties" ma:root="true" ma:fieldsID="375e732f81423a44c24ef989eb02442f" ns2:_="" ns3:_="">
     <xsd:import namespace="1f6a6638-2655-4a74-b9f8-16c1b5edccac"/>
@@ -49810,22 +49890,25 @@
 </ct:contentTypeSchema>
 </file>
 
-<file path=customXml/item2.xml><?xml version="1.0" encoding="utf-8"?>
-<?mso-contentType ?>
-<FormTemplates xmlns="http://schemas.microsoft.com/sharepoint/v3/contenttype/forms">
-  <Display>DocumentLibraryForm</Display>
-  <Edit>DocumentLibraryForm</Edit>
-  <New>DocumentLibraryForm</New>
-</FormTemplates>
+<file path=customXml/itemProps1.xml><?xml version="1.0" encoding="utf-8"?>
+<ds:datastoreItem xmlns:ds="http://schemas.openxmlformats.org/officeDocument/2006/customXml" ds:itemID="{97794DA4-B143-4F60-BF7C-EA867C43D1FE}">
+  <ds:schemaRefs>
+    <ds:schemaRef ds:uri="http://schemas.microsoft.com/office/2006/metadata/properties"/>
+    <ds:schemaRef ds:uri="http://schemas.microsoft.com/office/infopath/2007/PartnerControls"/>
+    <ds:schemaRef ds:uri="d62b6ecb-acff-4b24-a527-ff2b271ebe71"/>
+  </ds:schemaRefs>
+</ds:datastoreItem>
 </file>
 
-<file path=customXml/item3.xml><?xml version="1.0" encoding="utf-8"?>
-<p:properties xmlns:p="http://schemas.microsoft.com/office/2006/metadata/properties" xmlns:xsi="http://www.w3.org/2001/XMLSchema-instance" xmlns:pc="http://schemas.microsoft.com/office/infopath/2007/PartnerControls">
-  <documentManagement/>
-</p:properties>
+<file path=customXml/itemProps2.xml><?xml version="1.0" encoding="utf-8"?>
+<ds:datastoreItem xmlns:ds="http://schemas.openxmlformats.org/officeDocument/2006/customXml" ds:itemID="{6543A033-2779-4EB5-82E0-EE769341BA7A}">
+  <ds:schemaRefs>
+    <ds:schemaRef ds:uri="http://schemas.microsoft.com/sharepoint/v3/contenttype/forms"/>
+  </ds:schemaRefs>
+</ds:datastoreItem>
 </file>
 
-<file path=customXml/itemProps1.xml><?xml version="1.0" encoding="utf-8"?>
+<file path=customXml/itemProps3.xml><?xml version="1.0" encoding="utf-8"?>
 <ds:datastoreItem xmlns:ds="http://schemas.openxmlformats.org/officeDocument/2006/customXml" ds:itemID="{CCCB94B5-2582-4AC7-85D8-612CAD4FD0C1}">
   <ds:schemaRefs>
     <ds:schemaRef ds:uri="http://schemas.microsoft.com/office/2006/metadata/contentType"/>
@@ -49842,22 +49925,4 @@
     <ds:schemaRef ds:uri="http://schemas.microsoft.com/internal/obd"/>
   </ds:schemaRefs>
 </ds:datastoreItem>
-</file>
-
-<file path=customXml/itemProps2.xml><?xml version="1.0" encoding="utf-8"?>
-<ds:datastoreItem xmlns:ds="http://schemas.openxmlformats.org/officeDocument/2006/customXml" ds:itemID="{6543A033-2779-4EB5-82E0-EE769341BA7A}">
-  <ds:schemaRefs>
-    <ds:schemaRef ds:uri="http://schemas.microsoft.com/sharepoint/v3/contenttype/forms"/>
-  </ds:schemaRefs>
-</ds:datastoreItem>
-</file>
-
-<file path=customXml/itemProps3.xml><?xml version="1.0" encoding="utf-8"?>
-<ds:datastoreItem xmlns:ds="http://schemas.openxmlformats.org/officeDocument/2006/customXml" ds:itemID="{97794DA4-B143-4F60-BF7C-EA867C43D1FE}">
-  <ds:schemaRefs>
-    <ds:schemaRef ds:uri="http://schemas.microsoft.com/office/2006/metadata/properties"/>
-    <ds:schemaRef ds:uri="http://schemas.microsoft.com/office/infopath/2007/PartnerControls"/>
-    <ds:schemaRef ds:uri="d62b6ecb-acff-4b24-a527-ff2b271ebe71"/>
-  </ds:schemaRefs>
-</ds:datastoreItem>
 </file>
</xml_diff>

<commit_message>
Added prompts from answer; Added styling support for answer; Updated documents; Upgraded nuget package version;
</commit_message>
<xml_diff>
--- a/docs/VMC Hackathon 2024 - VMC.Chatbot - Demo.pptx
+++ b/docs/VMC Hackathon 2024 - VMC.Chatbot - Demo.pptx
@@ -6,26 +6,27 @@
     <p:sldMasterId id="2147483899" r:id="rId5"/>
   </p:sldMasterIdLst>
   <p:notesMasterIdLst>
-    <p:notesMasterId r:id="rId15"/>
+    <p:notesMasterId r:id="rId16"/>
   </p:notesMasterIdLst>
   <p:handoutMasterIdLst>
-    <p:handoutMasterId r:id="rId16"/>
+    <p:handoutMasterId r:id="rId17"/>
   </p:handoutMasterIdLst>
   <p:sldIdLst>
     <p:sldId id="256" r:id="rId6"/>
     <p:sldId id="264" r:id="rId7"/>
     <p:sldId id="265" r:id="rId8"/>
-    <p:sldId id="266" r:id="rId9"/>
-    <p:sldId id="268" r:id="rId10"/>
-    <p:sldId id="269" r:id="rId11"/>
-    <p:sldId id="270" r:id="rId12"/>
-    <p:sldId id="267" r:id="rId13"/>
-    <p:sldId id="259" r:id="rId14"/>
+    <p:sldId id="271" r:id="rId9"/>
+    <p:sldId id="272" r:id="rId10"/>
+    <p:sldId id="268" r:id="rId11"/>
+    <p:sldId id="269" r:id="rId12"/>
+    <p:sldId id="270" r:id="rId13"/>
+    <p:sldId id="267" r:id="rId14"/>
+    <p:sldId id="259" r:id="rId15"/>
   </p:sldIdLst>
   <p:sldSz cx="12192000" cy="6858000"/>
   <p:notesSz cx="6858000" cy="9144000"/>
   <p:custDataLst>
-    <p:tags r:id="rId17"/>
+    <p:tags r:id="rId18"/>
   </p:custDataLst>
   <p:defaultTextStyle>
     <a:defPPr>
@@ -289,7 +290,7 @@
               <a:pPr>
                 <a:defRPr/>
               </a:pPr>
-              <a:t>5/29/2024</a:t>
+              <a:t>5/31/2024</a:t>
             </a:fld>
             <a:endParaRPr lang="en-US"/>
           </a:p>
@@ -535,7 +536,7 @@
               <a:pPr>
                 <a:defRPr/>
               </a:pPr>
-              <a:t>5/29/2024</a:t>
+              <a:t>5/31/2024</a:t>
             </a:fld>
             <a:endParaRPr lang="en-US"/>
           </a:p>
@@ -43916,7 +43917,7 @@
             </a:pPr>
             <a:fld id="{FB89F83D-D94F-4E45-A8B2-6C514902A01F}" type="datetime1">
               <a:rPr lang="de-DE" smtClean="0"/>
-              <a:t>29.05.2024</a:t>
+              <a:t>31.05.2024</a:t>
             </a:fld>
             <a:endParaRPr lang="de-DE" dirty="0"/>
           </a:p>
@@ -46350,6 +46351,89 @@
 </p:sld>
 </file>
 
+<file path=ppt/slides/slide10.xml><?xml version="1.0" encoding="utf-8"?>
+<p:sld xmlns:a="http://schemas.openxmlformats.org/drawingml/2006/main" xmlns:r="http://schemas.openxmlformats.org/officeDocument/2006/relationships" xmlns:p="http://schemas.openxmlformats.org/presentationml/2006/main">
+  <p:cSld>
+    <p:spTree>
+      <p:nvGrpSpPr>
+        <p:cNvPr id="1" name=""/>
+        <p:cNvGrpSpPr/>
+        <p:nvPr/>
+      </p:nvGrpSpPr>
+      <p:grpSpPr>
+        <a:xfrm>
+          <a:off x="0" y="0"/>
+          <a:ext cx="0" cy="0"/>
+          <a:chOff x="0" y="0"/>
+          <a:chExt cx="0" cy="0"/>
+        </a:xfrm>
+      </p:grpSpPr>
+      <p:sp>
+        <p:nvSpPr>
+          <p:cNvPr id="2" name="Text Placeholder 1">
+            <a:extLst>
+              <a:ext uri="{FF2B5EF4-FFF2-40B4-BE49-F238E27FC236}">
+                <a16:creationId xmlns:a16="http://schemas.microsoft.com/office/drawing/2014/main" id="{59319340-3D40-4017-AE96-227E1D8E232D}"/>
+              </a:ext>
+            </a:extLst>
+          </p:cNvPr>
+          <p:cNvSpPr>
+            <a:spLocks noGrp="1"/>
+          </p:cNvSpPr>
+          <p:nvPr>
+            <p:ph type="body" sz="quarter" idx="13"/>
+          </p:nvPr>
+        </p:nvSpPr>
+        <p:spPr/>
+        <p:txBody>
+          <a:bodyPr/>
+          <a:lstStyle/>
+          <a:p>
+            <a:endParaRPr lang="en-US"/>
+          </a:p>
+        </p:txBody>
+      </p:sp>
+      <p:sp>
+        <p:nvSpPr>
+          <p:cNvPr id="3" name="Text Placeholder 2">
+            <a:extLst>
+              <a:ext uri="{FF2B5EF4-FFF2-40B4-BE49-F238E27FC236}">
+                <a16:creationId xmlns:a16="http://schemas.microsoft.com/office/drawing/2014/main" id="{A62E9BA5-CFFC-4654-83F4-9C29111AEBE4}"/>
+              </a:ext>
+            </a:extLst>
+          </p:cNvPr>
+          <p:cNvSpPr>
+            <a:spLocks noGrp="1"/>
+          </p:cNvSpPr>
+          <p:nvPr>
+            <p:ph type="body" sz="quarter" idx="11"/>
+          </p:nvPr>
+        </p:nvSpPr>
+        <p:spPr/>
+        <p:txBody>
+          <a:bodyPr/>
+          <a:lstStyle/>
+          <a:p>
+            <a:r>
+              <a:rPr lang="en-US" dirty="0"/>
+              <a:t>Thank you!</a:t>
+            </a:r>
+          </a:p>
+        </p:txBody>
+      </p:sp>
+    </p:spTree>
+    <p:extLst>
+      <p:ext uri="{BB962C8B-B14F-4D97-AF65-F5344CB8AC3E}">
+        <p14:creationId xmlns:p14="http://schemas.microsoft.com/office/powerpoint/2010/main" val="1343674845"/>
+      </p:ext>
+    </p:extLst>
+  </p:cSld>
+  <p:clrMapOvr>
+    <a:masterClrMapping/>
+  </p:clrMapOvr>
+</p:sld>
+</file>
+
 <file path=ppt/slides/slide2.xml><?xml version="1.0" encoding="utf-8"?>
 <p:sld xmlns:a="http://schemas.openxmlformats.org/drawingml/2006/main" xmlns:r="http://schemas.openxmlformats.org/officeDocument/2006/relationships" xmlns:p="http://schemas.openxmlformats.org/presentationml/2006/main">
   <p:cSld>
@@ -46468,22 +46552,6 @@
               <a:t>Simufact.Forming</a:t>
             </a:r>
             <a:endParaRPr lang="en-US" sz="1800" dirty="0"/>
-          </a:p>
-          <a:p>
-            <a:pPr>
-              <a:spcBef>
-                <a:spcPts val="1200"/>
-              </a:spcBef>
-              <a:spcAft>
-                <a:spcPts val="1200"/>
-              </a:spcAft>
-              <a:buFont typeface="Wingdings" panose="05000000000000000000" pitchFamily="2" charset="2"/>
-              <a:buChar char="Ø"/>
-            </a:pPr>
-            <a:r>
-              <a:rPr lang="en-US" sz="1800" dirty="0"/>
-              <a:t>Technologies</a:t>
-            </a:r>
           </a:p>
           <a:p>
             <a:pPr>
@@ -47277,10 +47345,10 @@
       </p:grpSpPr>
       <p:sp>
         <p:nvSpPr>
-          <p:cNvPr id="6" name="Text Placeholder 5">
+          <p:cNvPr id="2" name="Text Placeholder 1">
             <a:extLst>
               <a:ext uri="{FF2B5EF4-FFF2-40B4-BE49-F238E27FC236}">
-                <a16:creationId xmlns:a16="http://schemas.microsoft.com/office/drawing/2014/main" id="{6338410A-2A4D-119D-7A74-87A5A319BD26}"/>
+                <a16:creationId xmlns:a16="http://schemas.microsoft.com/office/drawing/2014/main" id="{DBD50962-FC01-3037-1B1E-63862A2B1760}"/>
               </a:ext>
             </a:extLst>
           </p:cNvPr>
@@ -47296,16 +47364,20 @@
           <a:bodyPr/>
           <a:lstStyle/>
           <a:p>
-            <a:endParaRPr lang="en-CA"/>
+            <a:r>
+              <a:rPr lang="en-US" dirty="0"/>
+              <a:t>Forming Suite</a:t>
+            </a:r>
+            <a:endParaRPr lang="en-CA" dirty="0"/>
           </a:p>
         </p:txBody>
       </p:sp>
       <p:sp>
         <p:nvSpPr>
-          <p:cNvPr id="5" name="Title 4">
+          <p:cNvPr id="3" name="Title 2">
             <a:extLst>
               <a:ext uri="{FF2B5EF4-FFF2-40B4-BE49-F238E27FC236}">
-                <a16:creationId xmlns:a16="http://schemas.microsoft.com/office/drawing/2014/main" id="{8819AAA7-5274-B198-980A-C3AAA017397E}"/>
+                <a16:creationId xmlns:a16="http://schemas.microsoft.com/office/drawing/2014/main" id="{08CD433F-8376-D1DA-BA69-2A37E93519C2}"/>
               </a:ext>
             </a:extLst>
           </p:cNvPr>
@@ -47323,7 +47395,7 @@
           <a:p>
             <a:r>
               <a:rPr lang="en-US" dirty="0"/>
-              <a:t>Technologies</a:t>
+              <a:t>Demo</a:t>
             </a:r>
             <a:endParaRPr lang="en-CA" dirty="0"/>
           </a:p>
@@ -47331,10 +47403,10 @@
       </p:sp>
       <p:sp>
         <p:nvSpPr>
-          <p:cNvPr id="7" name="Content Placeholder 6">
+          <p:cNvPr id="4" name="Content Placeholder 3">
             <a:extLst>
               <a:ext uri="{FF2B5EF4-FFF2-40B4-BE49-F238E27FC236}">
-                <a16:creationId xmlns:a16="http://schemas.microsoft.com/office/drawing/2014/main" id="{937AAA3D-4E08-947B-7D5C-D0A6BF807240}"/>
+                <a16:creationId xmlns:a16="http://schemas.microsoft.com/office/drawing/2014/main" id="{5625F66D-AD76-4F4F-5EAA-C554012B1ED9}"/>
               </a:ext>
             </a:extLst>
           </p:cNvPr>
@@ -47350,250 +47422,171 @@
           <a:bodyPr/>
           <a:lstStyle/>
           <a:p>
-            <a:pPr>
-              <a:lnSpc>
-                <a:spcPct val="100000"/>
-              </a:lnSpc>
-              <a:spcBef>
-                <a:spcPts val="600"/>
-              </a:spcBef>
-              <a:spcAft>
-                <a:spcPts val="600"/>
-              </a:spcAft>
-              <a:buFont typeface="Wingdings" panose="05000000000000000000" pitchFamily="2" charset="2"/>
-              <a:buChar char="Ø"/>
-            </a:pPr>
+            <a:r>
+              <a:rPr lang="en-US" dirty="0"/>
+              <a:t>Show toolbar and button to invoke chatbot</a:t>
+            </a:r>
+          </a:p>
+          <a:p>
+            <a:r>
+              <a:rPr lang="en-US" dirty="0"/>
+              <a:t>Query Knowledge Database</a:t>
+            </a:r>
+          </a:p>
+          <a:p>
+            <a:pPr lvl="1"/>
             <a:r>
               <a:rPr lang="en-US" dirty="0">
                 <a:solidFill>
                   <a:schemeClr val="tx1"/>
                 </a:solidFill>
-                <a:highlight>
-                  <a:srgbClr val="FFFFFF"/>
-                </a:highlight>
               </a:rPr>
-              <a:t>Azure Blob Storage for Static Hosting</a:t>
-            </a:r>
-          </a:p>
-          <a:p>
-            <a:pPr>
-              <a:lnSpc>
-                <a:spcPct val="100000"/>
-              </a:lnSpc>
-              <a:spcBef>
-                <a:spcPts val="600"/>
-              </a:spcBef>
-              <a:spcAft>
-                <a:spcPts val="600"/>
-              </a:spcAft>
-              <a:buFont typeface="Wingdings" panose="05000000000000000000" pitchFamily="2" charset="2"/>
-              <a:buChar char="Ø"/>
-            </a:pPr>
+              <a:t>Compare FS.chm search and chatbot search: </a:t>
+            </a:r>
+            <a:r>
+              <a:rPr lang="en-CA" dirty="0"/>
+              <a:t>How to edit part features </a:t>
+            </a:r>
+          </a:p>
+          <a:p>
+            <a:pPr lvl="1"/>
             <a:r>
               <a:rPr lang="en-US" dirty="0">
                 <a:solidFill>
                   <a:schemeClr val="tx1"/>
                 </a:solidFill>
-                <a:highlight>
-                  <a:srgbClr val="FFFFFF"/>
-                </a:highlight>
               </a:rPr>
-              <a:t>Azure Language Cognitive Service</a:t>
-            </a:r>
-          </a:p>
-          <a:p>
-            <a:pPr>
-              <a:lnSpc>
-                <a:spcPct val="100000"/>
-              </a:lnSpc>
-              <a:spcBef>
-                <a:spcPts val="600"/>
-              </a:spcBef>
-              <a:spcAft>
-                <a:spcPts val="600"/>
-              </a:spcAft>
-              <a:buFont typeface="Wingdings" panose="05000000000000000000" pitchFamily="2" charset="2"/>
-              <a:buChar char="Ø"/>
-            </a:pPr>
-            <a:r>
-              <a:rPr lang="en-US" dirty="0">
+              <a:t>Show query contents with follow up prompts: </a:t>
+            </a:r>
+            <a:r>
+              <a:rPr lang="en-CA" dirty="0">
                 <a:solidFill>
                   <a:schemeClr val="tx1"/>
                 </a:solidFill>
-                <a:highlight>
-                  <a:srgbClr val="FFFFFF"/>
-                </a:highlight>
               </a:rPr>
-              <a:t>Azure Language Studio</a:t>
-            </a:r>
-          </a:p>
-          <a:p>
-            <a:pPr>
-              <a:lnSpc>
-                <a:spcPct val="100000"/>
-              </a:lnSpc>
-              <a:spcBef>
-                <a:spcPts val="600"/>
-              </a:spcBef>
-              <a:spcAft>
-                <a:spcPts val="600"/>
-              </a:spcAft>
-              <a:buFont typeface="Wingdings" panose="05000000000000000000" pitchFamily="2" charset="2"/>
-              <a:buChar char="Ø"/>
-            </a:pPr>
-            <a:r>
-              <a:rPr lang="en-US" dirty="0">
+              <a:t>How to create double attached geometry</a:t>
+            </a:r>
+          </a:p>
+          <a:p>
+            <a:pPr lvl="1"/>
+            <a:r>
+              <a:rPr lang="en-CA" dirty="0">
                 <a:solidFill>
                   <a:schemeClr val="tx1"/>
                 </a:solidFill>
-                <a:highlight>
-                  <a:srgbClr val="FFFFFF"/>
-                </a:highlight>
               </a:rPr>
-              <a:t>Qt Network</a:t>
-            </a:r>
-          </a:p>
-          <a:p>
-            <a:pPr>
-              <a:lnSpc>
-                <a:spcPct val="100000"/>
-              </a:lnSpc>
-              <a:spcBef>
-                <a:spcPts val="600"/>
-              </a:spcBef>
-              <a:spcAft>
-                <a:spcPts val="600"/>
-              </a:spcAft>
-              <a:buFont typeface="Wingdings" panose="05000000000000000000" pitchFamily="2" charset="2"/>
-              <a:buChar char="Ø"/>
-            </a:pPr>
-            <a:r>
-              <a:rPr lang="en-US" dirty="0">
+              <a:t>Show query contents with styling:  /code How to import geometry and define its material</a:t>
+            </a:r>
+          </a:p>
+          <a:p>
+            <a:pPr lvl="1"/>
+            <a:r>
+              <a:rPr lang="en-CA" dirty="0">
                 <a:solidFill>
                   <a:schemeClr val="tx1"/>
                 </a:solidFill>
-                <a:highlight>
-                  <a:srgbClr val="FFFFFF"/>
-                </a:highlight>
               </a:rPr>
-              <a:t>Qt </a:t>
-            </a:r>
-            <a:r>
-              <a:rPr lang="en-US" dirty="0" err="1">
+              <a:t>Show query code: /code How to import geometry and define its material</a:t>
+            </a:r>
+          </a:p>
+          <a:p>
+            <a:pPr lvl="1"/>
+            <a:r>
+              <a:rPr lang="en-CA" dirty="0">
                 <a:solidFill>
                   <a:schemeClr val="tx1"/>
                 </a:solidFill>
-                <a:highlight>
-                  <a:srgbClr val="FFFFFF"/>
-                </a:highlight>
               </a:rPr>
-              <a:t>QWebEngine</a:t>
-            </a:r>
+              <a:t>Show query </a:t>
+            </a:r>
+            <a:r>
+              <a:rPr lang="en-CA" dirty="0" err="1">
+                <a:solidFill>
+                  <a:schemeClr val="tx1"/>
+                </a:solidFill>
+              </a:rPr>
+              <a:t>ui</a:t>
+            </a:r>
+            <a:r>
+              <a:rPr lang="en-CA" dirty="0">
+                <a:solidFill>
+                  <a:schemeClr val="tx1"/>
+                </a:solidFill>
+              </a:rPr>
+              <a:t>: /</a:t>
+            </a:r>
+            <a:r>
+              <a:rPr lang="en-CA" dirty="0" err="1">
+                <a:solidFill>
+                  <a:schemeClr val="tx1"/>
+                </a:solidFill>
+              </a:rPr>
+              <a:t>ui</a:t>
+            </a:r>
+            <a:r>
+              <a:rPr lang="en-CA" dirty="0">
+                <a:solidFill>
+                  <a:schemeClr val="tx1"/>
+                </a:solidFill>
+              </a:rPr>
+              <a:t> How to merge  geometry sets </a:t>
+            </a:r>
+          </a:p>
+          <a:p>
+            <a:pPr lvl="1"/>
+            <a:r>
+              <a:rPr lang="en-CA" dirty="0">
+                <a:solidFill>
+                  <a:schemeClr val="tx1"/>
+                </a:solidFill>
+              </a:rPr>
+              <a:t>Show query private content: Give me the abstract of sectionless addendum design</a:t>
+            </a:r>
+          </a:p>
+          <a:p>
+            <a:pPr lvl="1"/>
+            <a:r>
+              <a:rPr lang="en-CA" dirty="0">
+                <a:solidFill>
+                  <a:schemeClr val="tx1"/>
+                </a:solidFill>
+              </a:rPr>
+              <a:t>Show </a:t>
+            </a:r>
+            <a:r>
+              <a:rPr lang="en-CA" dirty="0" err="1">
+                <a:solidFill>
+                  <a:schemeClr val="tx1"/>
+                </a:solidFill>
+              </a:rPr>
+              <a:t>QnA</a:t>
+            </a:r>
+            <a:r>
+              <a:rPr lang="en-CA" dirty="0">
+                <a:solidFill>
+                  <a:schemeClr val="tx1"/>
+                </a:solidFill>
+              </a:rPr>
+              <a:t> playground for query testing</a:t>
+            </a:r>
+          </a:p>
+          <a:p>
+            <a:pPr lvl="1"/>
             <a:endParaRPr lang="en-US" dirty="0">
               <a:solidFill>
                 <a:schemeClr val="tx1"/>
               </a:solidFill>
-              <a:highlight>
-                <a:srgbClr val="FFFFFF"/>
-              </a:highlight>
             </a:endParaRPr>
           </a:p>
           <a:p>
-            <a:pPr>
-              <a:lnSpc>
-                <a:spcPct val="100000"/>
-              </a:lnSpc>
-              <a:spcBef>
-                <a:spcPts val="600"/>
-              </a:spcBef>
-              <a:spcAft>
-                <a:spcPts val="600"/>
-              </a:spcAft>
-              <a:buFont typeface="Wingdings" panose="05000000000000000000" pitchFamily="2" charset="2"/>
-              <a:buChar char="Ø"/>
-            </a:pPr>
-            <a:r>
-              <a:rPr lang="en-US" dirty="0">
-                <a:solidFill>
-                  <a:schemeClr val="tx1"/>
-                </a:solidFill>
-                <a:highlight>
-                  <a:srgbClr val="FFFFFF"/>
-                </a:highlight>
-              </a:rPr>
-              <a:t>Qt </a:t>
-            </a:r>
-            <a:r>
-              <a:rPr lang="en-US" dirty="0" err="1">
-                <a:solidFill>
-                  <a:schemeClr val="tx1"/>
-                </a:solidFill>
-                <a:highlight>
-                  <a:srgbClr val="FFFFFF"/>
-                </a:highlight>
-              </a:rPr>
-              <a:t>QWebEngineWidgets</a:t>
-            </a:r>
-            <a:endParaRPr lang="en-CA" dirty="0">
-              <a:solidFill>
-                <a:schemeClr val="tx1"/>
-              </a:solidFill>
-              <a:highlight>
-                <a:srgbClr val="FFFFFF"/>
-              </a:highlight>
-            </a:endParaRPr>
-          </a:p>
-          <a:p>
-            <a:pPr>
-              <a:lnSpc>
-                <a:spcPct val="100000"/>
-              </a:lnSpc>
-              <a:spcBef>
-                <a:spcPts val="600"/>
-              </a:spcBef>
-              <a:spcAft>
-                <a:spcPts val="600"/>
-              </a:spcAft>
-              <a:buFont typeface="Wingdings" panose="05000000000000000000" pitchFamily="2" charset="2"/>
-              <a:buChar char="Ø"/>
-            </a:pPr>
-            <a:r>
-              <a:rPr lang="en-CA" dirty="0">
-                <a:solidFill>
-                  <a:schemeClr val="tx1"/>
-                </a:solidFill>
-                <a:highlight>
-                  <a:srgbClr val="FFFFFF"/>
-                </a:highlight>
-              </a:rPr>
-              <a:t>Qt </a:t>
-            </a:r>
-            <a:r>
-              <a:rPr lang="en-CA" dirty="0" err="1">
-                <a:solidFill>
-                  <a:schemeClr val="tx1"/>
-                </a:solidFill>
-                <a:highlight>
-                  <a:srgbClr val="FFFFFF"/>
-                </a:highlight>
-              </a:rPr>
-              <a:t>QJsonDocument</a:t>
-            </a:r>
-            <a:endParaRPr lang="en-CA" dirty="0">
-              <a:solidFill>
-                <a:schemeClr val="tx1"/>
-              </a:solidFill>
-              <a:highlight>
-                <a:srgbClr val="FFFFFF"/>
-              </a:highlight>
-            </a:endParaRPr>
+            <a:endParaRPr lang="en-CA" dirty="0"/>
           </a:p>
         </p:txBody>
       </p:sp>
     </p:spTree>
     <p:extLst>
       <p:ext uri="{BB962C8B-B14F-4D97-AF65-F5344CB8AC3E}">
-        <p14:creationId xmlns:p14="http://schemas.microsoft.com/office/powerpoint/2010/main" val="1501945968"/>
+        <p14:creationId xmlns:p14="http://schemas.microsoft.com/office/powerpoint/2010/main" val="1150749464"/>
       </p:ext>
     </p:extLst>
   </p:cSld>
@@ -47625,7 +47618,7 @@
           <p:cNvPr id="2" name="Text Placeholder 1">
             <a:extLst>
               <a:ext uri="{FF2B5EF4-FFF2-40B4-BE49-F238E27FC236}">
-                <a16:creationId xmlns:a16="http://schemas.microsoft.com/office/drawing/2014/main" id="{B17163A0-B5E3-1919-4C35-123E028C33A5}"/>
+                <a16:creationId xmlns:a16="http://schemas.microsoft.com/office/drawing/2014/main" id="{D34B92C5-B243-7754-E9BB-4233550F39B0}"/>
               </a:ext>
             </a:extLst>
           </p:cNvPr>
@@ -47641,7 +47634,11 @@
           <a:bodyPr/>
           <a:lstStyle/>
           <a:p>
-            <a:endParaRPr lang="en-CA"/>
+            <a:r>
+              <a:rPr lang="en-US" dirty="0" err="1"/>
+              <a:t>Simufact.Forming</a:t>
+            </a:r>
+            <a:endParaRPr lang="en-CA" dirty="0"/>
           </a:p>
         </p:txBody>
       </p:sp>
@@ -47650,7 +47647,7 @@
           <p:cNvPr id="3" name="Title 2">
             <a:extLst>
               <a:ext uri="{FF2B5EF4-FFF2-40B4-BE49-F238E27FC236}">
-                <a16:creationId xmlns:a16="http://schemas.microsoft.com/office/drawing/2014/main" id="{68134BCC-963D-BD0F-8997-9108999F5052}"/>
+                <a16:creationId xmlns:a16="http://schemas.microsoft.com/office/drawing/2014/main" id="{E47219E9-4112-668E-3CB4-6A041D5C405A}"/>
               </a:ext>
             </a:extLst>
           </p:cNvPr>
@@ -47668,7 +47665,7 @@
           <a:p>
             <a:r>
               <a:rPr lang="en-US" dirty="0"/>
-              <a:t>What’s learned?</a:t>
+              <a:t>Demo</a:t>
             </a:r>
             <a:endParaRPr lang="en-CA" dirty="0"/>
           </a:p>
@@ -47679,7 +47676,7 @@
           <p:cNvPr id="4" name="Content Placeholder 3">
             <a:extLst>
               <a:ext uri="{FF2B5EF4-FFF2-40B4-BE49-F238E27FC236}">
-                <a16:creationId xmlns:a16="http://schemas.microsoft.com/office/drawing/2014/main" id="{F0FF9AEA-8D78-A917-1D77-B9544EE52C11}"/>
+                <a16:creationId xmlns:a16="http://schemas.microsoft.com/office/drawing/2014/main" id="{A3CD71F7-C4B6-072A-6D80-C778125AFC1A}"/>
               </a:ext>
             </a:extLst>
           </p:cNvPr>
@@ -47696,208 +47693,11 @@
           <a:lstStyle/>
           <a:p>
             <a:r>
-              <a:rPr lang="en-CA" dirty="0">
-                <a:solidFill>
-                  <a:schemeClr val="tx1"/>
-                </a:solidFill>
-              </a:rPr>
-              <a:t>What’s the best way to upload and store my knowledge documents?</a:t>
-            </a:r>
-          </a:p>
-          <a:p>
-            <a:pPr lvl="1"/>
-            <a:r>
-              <a:rPr lang="en-CA" dirty="0">
-                <a:solidFill>
-                  <a:schemeClr val="tx1"/>
-                </a:solidFill>
-              </a:rPr>
-              <a:t>Azure Blob Storage Service (Static Web Hosting)</a:t>
-            </a:r>
-          </a:p>
-          <a:p>
-            <a:r>
-              <a:rPr lang="en-CA" dirty="0">
-                <a:solidFill>
-                  <a:schemeClr val="tx1"/>
-                </a:solidFill>
-              </a:rPr>
-              <a:t>What’s the best way to set up my knowledge database?</a:t>
-            </a:r>
-          </a:p>
-          <a:p>
-            <a:pPr lvl="1"/>
-            <a:r>
-              <a:rPr lang="en-CA" dirty="0">
-                <a:solidFill>
-                  <a:schemeClr val="tx1"/>
-                </a:solidFill>
-              </a:rPr>
-              <a:t>Azure Language Studio</a:t>
-            </a:r>
-          </a:p>
-          <a:p>
-            <a:r>
-              <a:rPr lang="en-US" dirty="0">
-                <a:solidFill>
-                  <a:schemeClr val="tx1"/>
-                </a:solidFill>
-              </a:rPr>
-              <a:t>What’s the best document format for feeding the Azure Cognitive engine?</a:t>
-            </a:r>
-          </a:p>
-          <a:p>
-            <a:pPr lvl="1"/>
-            <a:r>
-              <a:rPr lang="en-CA" dirty="0">
-                <a:solidFill>
-                  <a:schemeClr val="tx1"/>
-                </a:solidFill>
-              </a:rPr>
-              <a:t>Structured Text + Resource Links: MARKDOWN, HTML</a:t>
-            </a:r>
-          </a:p>
-          <a:p>
-            <a:r>
-              <a:rPr lang="en-CA" dirty="0">
-                <a:solidFill>
-                  <a:schemeClr val="tx1"/>
-                </a:solidFill>
-              </a:rPr>
-              <a:t>Why is URL sources preferred in Language Studio?</a:t>
-            </a:r>
-          </a:p>
-          <a:p>
-            <a:pPr lvl="1"/>
-            <a:r>
-              <a:rPr lang="en-CA" dirty="0">
-                <a:solidFill>
-                  <a:schemeClr val="tx1"/>
-                </a:solidFill>
-              </a:rPr>
-              <a:t>Direct uploading has much stricter file and storage limits</a:t>
-            </a:r>
-          </a:p>
-          <a:p>
-            <a:r>
-              <a:rPr lang="en-CA" dirty="0">
-                <a:solidFill>
-                  <a:schemeClr val="tx1"/>
-                </a:solidFill>
-              </a:rPr>
-              <a:t>Does it take very long time to digest the documents?</a:t>
-            </a:r>
-          </a:p>
-          <a:p>
-            <a:pPr lvl="1"/>
-            <a:r>
-              <a:rPr lang="en-CA" dirty="0">
-                <a:solidFill>
-                  <a:schemeClr val="tx1"/>
-                </a:solidFill>
-              </a:rPr>
-              <a:t>No, the performance is good</a:t>
-            </a:r>
-          </a:p>
-          <a:p>
-            <a:r>
-              <a:rPr lang="en-CA" dirty="0">
-                <a:solidFill>
-                  <a:schemeClr val="tx1"/>
-                </a:solidFill>
-              </a:rPr>
-              <a:t>How can I improve my Knowledge Database?</a:t>
-            </a:r>
-          </a:p>
-          <a:p>
-            <a:pPr lvl="1"/>
-            <a:r>
-              <a:rPr lang="en-CA" dirty="0">
-                <a:solidFill>
-                  <a:schemeClr val="tx1"/>
-                </a:solidFill>
-              </a:rPr>
-              <a:t>The more feeds, the better answers.</a:t>
-            </a:r>
-          </a:p>
-          <a:p>
-            <a:pPr lvl="1"/>
-            <a:r>
-              <a:rPr lang="en-CA" dirty="0">
-                <a:solidFill>
-                  <a:schemeClr val="tx1"/>
-                </a:solidFill>
-              </a:rPr>
-              <a:t>Synonyms and follow-up prompts are available</a:t>
-            </a:r>
-          </a:p>
-          <a:p>
-            <a:r>
-              <a:rPr lang="en-CA" dirty="0">
-                <a:solidFill>
-                  <a:schemeClr val="tx1"/>
-                </a:solidFill>
-              </a:rPr>
-              <a:t>Can I test my Knowledge Database and improve the answers?</a:t>
-            </a:r>
-          </a:p>
-          <a:p>
-            <a:pPr lvl="1"/>
-            <a:r>
-              <a:rPr lang="en-CA" dirty="0">
-                <a:solidFill>
-                  <a:schemeClr val="tx1"/>
-                </a:solidFill>
-              </a:rPr>
-              <a:t>Yes, test tool is available</a:t>
-            </a:r>
-          </a:p>
-          <a:p>
-            <a:endParaRPr lang="en-CA" dirty="0">
-              <a:solidFill>
-                <a:schemeClr val="tx1"/>
-              </a:solidFill>
-            </a:endParaRPr>
-          </a:p>
-          <a:p>
-            <a:pPr marL="0" indent="0">
-              <a:buNone/>
-            </a:pPr>
-            <a:endParaRPr lang="en-CA" dirty="0">
-              <a:solidFill>
-                <a:schemeClr val="tx1"/>
-              </a:solidFill>
-            </a:endParaRPr>
-          </a:p>
-          <a:p>
-            <a:pPr marL="0" indent="0">
-              <a:buNone/>
-            </a:pPr>
-            <a:endParaRPr lang="en-CA" dirty="0">
-              <a:solidFill>
-                <a:schemeClr val="tx1"/>
-              </a:solidFill>
-            </a:endParaRPr>
-          </a:p>
-          <a:p>
-            <a:pPr marL="0" indent="0">
-              <a:buNone/>
-            </a:pPr>
-            <a:endParaRPr lang="en-CA" dirty="0">
-              <a:solidFill>
-                <a:schemeClr val="tx1"/>
-              </a:solidFill>
-            </a:endParaRPr>
-          </a:p>
-          <a:p>
-            <a:endParaRPr lang="en-CA" dirty="0">
-              <a:solidFill>
-                <a:schemeClr val="tx1"/>
-              </a:solidFill>
-            </a:endParaRPr>
-          </a:p>
-          <a:p>
-            <a:pPr lvl="1"/>
+              <a:rPr lang="en-US" dirty="0"/>
+              <a:t>Show toolbar and button to invoke chatbot</a:t>
+            </a:r>
+          </a:p>
+          <a:p>
             <a:endParaRPr lang="en-CA" dirty="0"/>
           </a:p>
         </p:txBody>
@@ -47905,7 +47705,7 @@
     </p:spTree>
     <p:extLst>
       <p:ext uri="{BB962C8B-B14F-4D97-AF65-F5344CB8AC3E}">
-        <p14:creationId xmlns:p14="http://schemas.microsoft.com/office/powerpoint/2010/main" val="2504123800"/>
+        <p14:creationId xmlns:p14="http://schemas.microsoft.com/office/powerpoint/2010/main" val="1229578972"/>
       </p:ext>
     </p:extLst>
   </p:cSld>
@@ -47937,7 +47737,7 @@
           <p:cNvPr id="2" name="Text Placeholder 1">
             <a:extLst>
               <a:ext uri="{FF2B5EF4-FFF2-40B4-BE49-F238E27FC236}">
-                <a16:creationId xmlns:a16="http://schemas.microsoft.com/office/drawing/2014/main" id="{73726631-36F8-3FA7-8B59-66F185FA0125}"/>
+                <a16:creationId xmlns:a16="http://schemas.microsoft.com/office/drawing/2014/main" id="{B17163A0-B5E3-1919-4C35-123E028C33A5}"/>
               </a:ext>
             </a:extLst>
           </p:cNvPr>
@@ -47962,7 +47762,7 @@
           <p:cNvPr id="3" name="Title 2">
             <a:extLst>
               <a:ext uri="{FF2B5EF4-FFF2-40B4-BE49-F238E27FC236}">
-                <a16:creationId xmlns:a16="http://schemas.microsoft.com/office/drawing/2014/main" id="{06DD545D-A820-1AD8-4CFA-12F9E097C1A3}"/>
+                <a16:creationId xmlns:a16="http://schemas.microsoft.com/office/drawing/2014/main" id="{68134BCC-963D-BD0F-8997-9108999F5052}"/>
               </a:ext>
             </a:extLst>
           </p:cNvPr>
@@ -47980,7 +47780,7 @@
           <a:p>
             <a:r>
               <a:rPr lang="en-US" dirty="0"/>
-              <a:t>What’s learned? (Cont.)</a:t>
+              <a:t>What’s learned?</a:t>
             </a:r>
             <a:endParaRPr lang="en-CA" dirty="0"/>
           </a:p>
@@ -47991,7 +47791,7 @@
           <p:cNvPr id="4" name="Content Placeholder 3">
             <a:extLst>
               <a:ext uri="{FF2B5EF4-FFF2-40B4-BE49-F238E27FC236}">
-                <a16:creationId xmlns:a16="http://schemas.microsoft.com/office/drawing/2014/main" id="{C02A8DB7-2C50-85EC-FF57-1C3DD1C33B7D}"/>
+                <a16:creationId xmlns:a16="http://schemas.microsoft.com/office/drawing/2014/main" id="{F0FF9AEA-8D78-A917-1D77-B9544EE52C11}"/>
               </a:ext>
             </a:extLst>
           </p:cNvPr>
@@ -48008,136 +47808,205 @@
           <a:lstStyle/>
           <a:p>
             <a:r>
-              <a:rPr lang="en-US" dirty="0"/>
-              <a:t>Can I call Azure Language Cognitive Service directly from my Qt application?</a:t>
+              <a:rPr lang="en-CA" dirty="0">
+                <a:solidFill>
+                  <a:schemeClr val="tx1"/>
+                </a:solidFill>
+              </a:rPr>
+              <a:t>What’s the best way to upload and store my knowledge documents?</a:t>
             </a:r>
           </a:p>
           <a:p>
             <a:pPr lvl="1"/>
             <a:r>
-              <a:rPr lang="en-CA" dirty="0"/>
-              <a:t>Yes, using Qt Network module</a:t>
-            </a:r>
-          </a:p>
-          <a:p>
-            <a:r>
-              <a:rPr lang="en-CA" dirty="0"/>
-              <a:t>Can Azure Language Cognitive Service learn from my script examples and generate script for me?</a:t>
+              <a:rPr lang="en-CA" dirty="0">
+                <a:solidFill>
+                  <a:schemeClr val="tx1"/>
+                </a:solidFill>
+              </a:rPr>
+              <a:t>Azure Blob Storage Service (Static Web Hosting)</a:t>
+            </a:r>
+          </a:p>
+          <a:p>
+            <a:r>
+              <a:rPr lang="en-CA" dirty="0">
+                <a:solidFill>
+                  <a:schemeClr val="tx1"/>
+                </a:solidFill>
+              </a:rPr>
+              <a:t>What’s the best way to set up my knowledge database?</a:t>
             </a:r>
           </a:p>
           <a:p>
             <a:pPr lvl="1"/>
             <a:r>
-              <a:rPr lang="en-CA" dirty="0"/>
-              <a:t>No, it’s not meant for code understanding and generation.</a:t>
-            </a:r>
-          </a:p>
-          <a:p>
-            <a:r>
-              <a:rPr lang="en-CA" dirty="0"/>
-              <a:t>What’s the advantages of using chatbot instead of searching documents?</a:t>
+              <a:rPr lang="en-CA" dirty="0">
+                <a:solidFill>
+                  <a:schemeClr val="tx1"/>
+                </a:solidFill>
+              </a:rPr>
+              <a:t>Azure Language Studio</a:t>
+            </a:r>
+          </a:p>
+          <a:p>
+            <a:r>
+              <a:rPr lang="en-US" dirty="0">
+                <a:solidFill>
+                  <a:schemeClr val="tx1"/>
+                </a:solidFill>
+              </a:rPr>
+              <a:t>What’s the best document format for feeding the Azure Cognitive engine?</a:t>
             </a:r>
           </a:p>
           <a:p>
             <a:pPr lvl="1"/>
             <a:r>
-              <a:rPr lang="en-CA" dirty="0"/>
-              <a:t>Searching documents: context unaware / multiple results without ranking</a:t>
+              <a:rPr lang="en-CA" dirty="0">
+                <a:solidFill>
+                  <a:schemeClr val="tx1"/>
+                </a:solidFill>
+              </a:rPr>
+              <a:t>Structured Text + Resource Links: MARKDOWN, HTML</a:t>
+            </a:r>
+          </a:p>
+          <a:p>
+            <a:r>
+              <a:rPr lang="en-CA" dirty="0">
+                <a:solidFill>
+                  <a:schemeClr val="tx1"/>
+                </a:solidFill>
+              </a:rPr>
+              <a:t>Why is URL sources preferred in Language Studio?</a:t>
             </a:r>
           </a:p>
           <a:p>
             <a:pPr lvl="1"/>
             <a:r>
-              <a:rPr lang="en-CA" dirty="0"/>
-              <a:t>Using chatbot: context aware / responses based on confidence level</a:t>
-            </a:r>
-          </a:p>
-          <a:p>
-            <a:r>
-              <a:rPr lang="en-CA" dirty="0"/>
-              <a:t>What are the advantages of our Embedded </a:t>
-            </a:r>
-            <a:r>
-              <a:rPr lang="en-CA" dirty="0" err="1"/>
-              <a:t>VMC.Copilot</a:t>
-            </a:r>
-            <a:r>
-              <a:rPr lang="en-CA" dirty="0"/>
-              <a:t> (EC) vs. Microsoft Copilot (MC)?</a:t>
+              <a:rPr lang="en-CA" dirty="0">
+                <a:solidFill>
+                  <a:schemeClr val="tx1"/>
+                </a:solidFill>
+              </a:rPr>
+              <a:t>Direct uploading has much stricter file and storage limits</a:t>
+            </a:r>
+          </a:p>
+          <a:p>
+            <a:r>
+              <a:rPr lang="en-CA" dirty="0">
+                <a:solidFill>
+                  <a:schemeClr val="tx1"/>
+                </a:solidFill>
+              </a:rPr>
+              <a:t>Does it take very long time to digest the documents?</a:t>
             </a:r>
           </a:p>
           <a:p>
             <a:pPr lvl="1"/>
             <a:r>
-              <a:rPr lang="en-CA" dirty="0"/>
-              <a:t>Knowledge domains:</a:t>
-            </a:r>
-          </a:p>
-          <a:p>
-            <a:pPr lvl="2"/>
-            <a:r>
-              <a:rPr lang="en-CA" dirty="0"/>
-              <a:t>MC: public domain</a:t>
-            </a:r>
-          </a:p>
-          <a:p>
-            <a:pPr lvl="2"/>
-            <a:r>
-              <a:rPr lang="en-CA" dirty="0"/>
-              <a:t>EC: selected public + private domains</a:t>
+              <a:rPr lang="en-CA" dirty="0">
+                <a:solidFill>
+                  <a:schemeClr val="tx1"/>
+                </a:solidFill>
+              </a:rPr>
+              <a:t>No, the performance is good</a:t>
+            </a:r>
+          </a:p>
+          <a:p>
+            <a:r>
+              <a:rPr lang="en-CA" dirty="0">
+                <a:solidFill>
+                  <a:schemeClr val="tx1"/>
+                </a:solidFill>
+              </a:rPr>
+              <a:t>How can I improve my Knowledge Database?</a:t>
             </a:r>
           </a:p>
           <a:p>
             <a:pPr lvl="1"/>
             <a:r>
-              <a:rPr lang="en-CA" dirty="0"/>
-              <a:t>Answer format:</a:t>
-            </a:r>
-          </a:p>
-          <a:p>
-            <a:pPr lvl="2"/>
-            <a:r>
-              <a:rPr lang="en-CA" dirty="0"/>
-              <a:t>MC: most are text based without images</a:t>
-            </a:r>
-          </a:p>
-          <a:p>
-            <a:pPr lvl="2"/>
-            <a:r>
-              <a:rPr lang="en-CA" dirty="0"/>
-              <a:t>EC: anything we want</a:t>
+              <a:rPr lang="en-CA" dirty="0">
+                <a:solidFill>
+                  <a:schemeClr val="tx1"/>
+                </a:solidFill>
+              </a:rPr>
+              <a:t>The more feeds, the better answers.</a:t>
             </a:r>
           </a:p>
           <a:p>
             <a:pPr lvl="1"/>
             <a:r>
-              <a:rPr lang="en-CA" dirty="0"/>
-              <a:t>Interaction within software:</a:t>
-            </a:r>
-          </a:p>
-          <a:p>
-            <a:pPr lvl="2"/>
-            <a:r>
-              <a:rPr lang="en-CA" dirty="0"/>
-              <a:t>MC: not feasible</a:t>
-            </a:r>
-          </a:p>
-          <a:p>
-            <a:pPr lvl="2"/>
-            <a:r>
-              <a:rPr lang="en-CA" dirty="0"/>
-              <a:t>EC: anything we want</a:t>
-            </a:r>
+              <a:rPr lang="en-CA" dirty="0">
+                <a:solidFill>
+                  <a:schemeClr val="tx1"/>
+                </a:solidFill>
+              </a:rPr>
+              <a:t>Synonyms and follow-up prompts are available</a:t>
+            </a:r>
+          </a:p>
+          <a:p>
+            <a:r>
+              <a:rPr lang="en-CA" dirty="0">
+                <a:solidFill>
+                  <a:schemeClr val="tx1"/>
+                </a:solidFill>
+              </a:rPr>
+              <a:t>Can I test my Knowledge Database and improve the answers?</a:t>
+            </a:r>
+          </a:p>
+          <a:p>
+            <a:pPr lvl="1"/>
+            <a:r>
+              <a:rPr lang="en-CA" dirty="0">
+                <a:solidFill>
+                  <a:schemeClr val="tx1"/>
+                </a:solidFill>
+              </a:rPr>
+              <a:t>Yes, test tool is available</a:t>
+            </a:r>
+          </a:p>
+          <a:p>
+            <a:endParaRPr lang="en-CA" dirty="0">
+              <a:solidFill>
+                <a:schemeClr val="tx1"/>
+              </a:solidFill>
+            </a:endParaRPr>
           </a:p>
           <a:p>
             <a:pPr marL="0" indent="0">
               <a:buNone/>
             </a:pPr>
-            <a:endParaRPr lang="en-CA" dirty="0"/>
-          </a:p>
-          <a:p>
-            <a:pPr lvl="2"/>
-            <a:endParaRPr lang="en-CA" dirty="0"/>
+            <a:endParaRPr lang="en-CA" dirty="0">
+              <a:solidFill>
+                <a:schemeClr val="tx1"/>
+              </a:solidFill>
+            </a:endParaRPr>
+          </a:p>
+          <a:p>
+            <a:pPr marL="0" indent="0">
+              <a:buNone/>
+            </a:pPr>
+            <a:endParaRPr lang="en-CA" dirty="0">
+              <a:solidFill>
+                <a:schemeClr val="tx1"/>
+              </a:solidFill>
+            </a:endParaRPr>
+          </a:p>
+          <a:p>
+            <a:pPr marL="0" indent="0">
+              <a:buNone/>
+            </a:pPr>
+            <a:endParaRPr lang="en-CA" dirty="0">
+              <a:solidFill>
+                <a:schemeClr val="tx1"/>
+              </a:solidFill>
+            </a:endParaRPr>
+          </a:p>
+          <a:p>
+            <a:endParaRPr lang="en-CA" dirty="0">
+              <a:solidFill>
+                <a:schemeClr val="tx1"/>
+              </a:solidFill>
+            </a:endParaRPr>
           </a:p>
           <a:p>
             <a:pPr lvl="1"/>
@@ -48148,7 +48017,7 @@
     </p:spTree>
     <p:extLst>
       <p:ext uri="{BB962C8B-B14F-4D97-AF65-F5344CB8AC3E}">
-        <p14:creationId xmlns:p14="http://schemas.microsoft.com/office/powerpoint/2010/main" val="29960138"/>
+        <p14:creationId xmlns:p14="http://schemas.microsoft.com/office/powerpoint/2010/main" val="2504123800"/>
       </p:ext>
     </p:extLst>
   </p:cSld>
@@ -48180,7 +48049,7 @@
           <p:cNvPr id="2" name="Text Placeholder 1">
             <a:extLst>
               <a:ext uri="{FF2B5EF4-FFF2-40B4-BE49-F238E27FC236}">
-                <a16:creationId xmlns:a16="http://schemas.microsoft.com/office/drawing/2014/main" id="{BFEEF7FB-E47B-943C-7ACC-F8204FE88D1B}"/>
+                <a16:creationId xmlns:a16="http://schemas.microsoft.com/office/drawing/2014/main" id="{73726631-36F8-3FA7-8B59-66F185FA0125}"/>
               </a:ext>
             </a:extLst>
           </p:cNvPr>
@@ -48205,7 +48074,7 @@
           <p:cNvPr id="3" name="Title 2">
             <a:extLst>
               <a:ext uri="{FF2B5EF4-FFF2-40B4-BE49-F238E27FC236}">
-                <a16:creationId xmlns:a16="http://schemas.microsoft.com/office/drawing/2014/main" id="{269EC857-E2DD-B985-1DF4-18414EDD451F}"/>
+                <a16:creationId xmlns:a16="http://schemas.microsoft.com/office/drawing/2014/main" id="{06DD545D-A820-1AD8-4CFA-12F9E097C1A3}"/>
               </a:ext>
             </a:extLst>
           </p:cNvPr>
@@ -48234,7 +48103,7 @@
           <p:cNvPr id="4" name="Content Placeholder 3">
             <a:extLst>
               <a:ext uri="{FF2B5EF4-FFF2-40B4-BE49-F238E27FC236}">
-                <a16:creationId xmlns:a16="http://schemas.microsoft.com/office/drawing/2014/main" id="{9A85F99E-ADF7-F268-6883-D55A7535720A}"/>
+                <a16:creationId xmlns:a16="http://schemas.microsoft.com/office/drawing/2014/main" id="{C02A8DB7-2C50-85EC-FF57-1C3DD1C33B7D}"/>
               </a:ext>
             </a:extLst>
           </p:cNvPr>
@@ -48251,109 +48120,147 @@
           <a:lstStyle/>
           <a:p>
             <a:r>
+              <a:rPr lang="en-US" dirty="0"/>
+              <a:t>Can I call Azure Language Cognitive Service directly from my Qt application?</a:t>
+            </a:r>
+          </a:p>
+          <a:p>
+            <a:pPr lvl="1"/>
+            <a:r>
               <a:rPr lang="en-CA" dirty="0"/>
-              <a:t>Why choose Microsoft Azure, not AWS, Google AI or other service providers?</a:t>
+              <a:t>Yes, using Qt Network module</a:t>
+            </a:r>
+          </a:p>
+          <a:p>
+            <a:r>
+              <a:rPr lang="en-CA" dirty="0"/>
+              <a:t>Can Azure Language Cognitive Service learn from my script examples and generate script for me?</a:t>
             </a:r>
           </a:p>
           <a:p>
             <a:pPr lvl="1"/>
             <a:r>
               <a:rPr lang="en-CA" dirty="0"/>
-              <a:t>We have subscriptions with Microsoft Azure</a:t>
-            </a:r>
-          </a:p>
-          <a:p>
-            <a:r>
-              <a:rPr lang="en-US" dirty="0"/>
-              <a:t>Is that safe to let Azure Language Cognitive Service to digest my documents and scripts?</a:t>
+              <a:t>No, it’s not meant for code understanding and generation.</a:t>
+            </a:r>
+          </a:p>
+          <a:p>
+            <a:r>
+              <a:rPr lang="en-CA" dirty="0"/>
+              <a:t>What’s the advantages of using chatbot instead of searching documents?</a:t>
             </a:r>
           </a:p>
           <a:p>
             <a:pPr lvl="1"/>
             <a:r>
-              <a:rPr lang="en-US" dirty="0"/>
-              <a:t>Yes, those are user materials.</a:t>
-            </a:r>
-          </a:p>
-          <a:p>
-            <a:r>
-              <a:rPr lang="en-US" dirty="0"/>
-              <a:t>Can I use it in other products?</a:t>
+              <a:rPr lang="en-CA" dirty="0"/>
+              <a:t>Searching documents: context unaware / multiple results without ranking</a:t>
             </a:r>
           </a:p>
           <a:p>
             <a:pPr lvl="1"/>
             <a:r>
-              <a:rPr lang="en-US" dirty="0"/>
-              <a:t>Yes, the core is NuGet packaged and can be easily adapted to any products.</a:t>
-            </a:r>
-          </a:p>
-          <a:p>
-            <a:r>
-              <a:rPr lang="en-US" dirty="0"/>
-              <a:t>Can I ask using a different language and get answers in that language?</a:t>
+              <a:rPr lang="en-CA" dirty="0"/>
+              <a:t>Using chatbot: context aware / responses based on confidence level</a:t>
+            </a:r>
+          </a:p>
+          <a:p>
+            <a:r>
+              <a:rPr lang="en-CA" dirty="0"/>
+              <a:t>What are the advantages of our Embedded </a:t>
+            </a:r>
+            <a:r>
+              <a:rPr lang="en-CA" dirty="0" err="1"/>
+              <a:t>VMC.Copilot</a:t>
+            </a:r>
+            <a:r>
+              <a:rPr lang="en-CA" dirty="0"/>
+              <a:t> (EC) vs. Microsoft Copilot (MC)?</a:t>
             </a:r>
           </a:p>
           <a:p>
             <a:pPr lvl="1"/>
             <a:r>
-              <a:rPr lang="en-US" dirty="0"/>
-              <a:t>Yes, feasible with Azure Language Translation service</a:t>
-            </a:r>
-          </a:p>
-          <a:p>
-            <a:r>
-              <a:rPr lang="en-US" dirty="0"/>
-              <a:t>Is that expensive to use the Azure Blob Storage service?</a:t>
+              <a:rPr lang="en-CA" dirty="0"/>
+              <a:t>Knowledge domains:</a:t>
+            </a:r>
+          </a:p>
+          <a:p>
+            <a:pPr lvl="2"/>
+            <a:r>
+              <a:rPr lang="en-CA" dirty="0"/>
+              <a:t>MC: public domain</a:t>
+            </a:r>
+          </a:p>
+          <a:p>
+            <a:pPr lvl="2"/>
+            <a:r>
+              <a:rPr lang="en-CA" dirty="0"/>
+              <a:t>EC: selected public + private domains</a:t>
             </a:r>
           </a:p>
           <a:p>
             <a:pPr lvl="1"/>
             <a:r>
-              <a:rPr lang="en-US"/>
-              <a:t>No</a:t>
-            </a:r>
-            <a:endParaRPr lang="en-US" dirty="0"/>
-          </a:p>
-          <a:p>
-            <a:r>
-              <a:rPr lang="en-US" dirty="0"/>
-              <a:t>Is that expensive to use the Azure Language Cognitive Service?</a:t>
+              <a:rPr lang="en-CA" dirty="0"/>
+              <a:t>Answer format:</a:t>
+            </a:r>
+          </a:p>
+          <a:p>
+            <a:pPr lvl="2"/>
+            <a:r>
+              <a:rPr lang="en-CA" dirty="0"/>
+              <a:t>MC: most are text based without images</a:t>
+            </a:r>
+          </a:p>
+          <a:p>
+            <a:pPr lvl="2"/>
+            <a:r>
+              <a:rPr lang="en-CA" dirty="0"/>
+              <a:t>EC: anything we want</a:t>
             </a:r>
           </a:p>
           <a:p>
             <a:pPr lvl="1"/>
             <a:r>
-              <a:rPr lang="en-US" dirty="0"/>
-              <a:t>Depends on the service call volume, in my experiment: $0/m(F0) or ~$40/m (S1) for 18M document training and querying. The tier is controllable.</a:t>
-            </a:r>
+              <a:rPr lang="en-CA" dirty="0"/>
+              <a:t>Interaction within software:</a:t>
+            </a:r>
+          </a:p>
+          <a:p>
+            <a:pPr lvl="2"/>
+            <a:r>
+              <a:rPr lang="en-CA" dirty="0"/>
+              <a:t>MC: not feasible</a:t>
+            </a:r>
+          </a:p>
+          <a:p>
+            <a:pPr lvl="2"/>
+            <a:r>
+              <a:rPr lang="en-CA" dirty="0"/>
+              <a:t>EC: anything we want</a:t>
+            </a:r>
+          </a:p>
+          <a:p>
+            <a:pPr marL="0" indent="0">
+              <a:buNone/>
+            </a:pPr>
+            <a:endParaRPr lang="en-CA" dirty="0"/>
+          </a:p>
+          <a:p>
+            <a:pPr lvl="2"/>
+            <a:endParaRPr lang="en-CA" dirty="0"/>
           </a:p>
           <a:p>
             <a:pPr lvl="1"/>
-            <a:r>
-              <a:rPr lang="en-US" dirty="0"/>
-              <a:t>Projecting in production ~$100/m for one product</a:t>
-            </a:r>
-          </a:p>
-          <a:p>
-            <a:pPr lvl="1"/>
-            <a:r>
-              <a:rPr lang="en-US" dirty="0"/>
-              <a:t>Comparing tons of subscription credits are wasted, this is just a tiny fraction of the expenses.</a:t>
-            </a:r>
-          </a:p>
-          <a:p>
-            <a:pPr marL="0" indent="0">
-              <a:buNone/>
-            </a:pPr>
-            <a:endParaRPr lang="en-US" dirty="0"/>
+            <a:endParaRPr lang="en-CA" dirty="0"/>
           </a:p>
         </p:txBody>
       </p:sp>
     </p:spTree>
     <p:extLst>
       <p:ext uri="{BB962C8B-B14F-4D97-AF65-F5344CB8AC3E}">
-        <p14:creationId xmlns:p14="http://schemas.microsoft.com/office/powerpoint/2010/main" val="3147653832"/>
+        <p14:creationId xmlns:p14="http://schemas.microsoft.com/office/powerpoint/2010/main" val="29960138"/>
       </p:ext>
     </p:extLst>
   </p:cSld>
@@ -48385,7 +48292,7 @@
           <p:cNvPr id="2" name="Text Placeholder 1">
             <a:extLst>
               <a:ext uri="{FF2B5EF4-FFF2-40B4-BE49-F238E27FC236}">
-                <a16:creationId xmlns:a16="http://schemas.microsoft.com/office/drawing/2014/main" id="{CC5500BF-795A-6927-7D6C-99DB2E4C81C0}"/>
+                <a16:creationId xmlns:a16="http://schemas.microsoft.com/office/drawing/2014/main" id="{BFEEF7FB-E47B-943C-7ACC-F8204FE88D1B}"/>
               </a:ext>
             </a:extLst>
           </p:cNvPr>
@@ -48410,7 +48317,7 @@
           <p:cNvPr id="3" name="Title 2">
             <a:extLst>
               <a:ext uri="{FF2B5EF4-FFF2-40B4-BE49-F238E27FC236}">
-                <a16:creationId xmlns:a16="http://schemas.microsoft.com/office/drawing/2014/main" id="{B1266E83-D9FE-3A67-6C93-987BCDAA984E}"/>
+                <a16:creationId xmlns:a16="http://schemas.microsoft.com/office/drawing/2014/main" id="{269EC857-E2DD-B985-1DF4-18414EDD451F}"/>
               </a:ext>
             </a:extLst>
           </p:cNvPr>
@@ -48428,7 +48335,7 @@
           <a:p>
             <a:r>
               <a:rPr lang="en-US" dirty="0"/>
-              <a:t>Extend Check List</a:t>
+              <a:t>What’s learned? (Cont.)</a:t>
             </a:r>
             <a:endParaRPr lang="en-CA" dirty="0"/>
           </a:p>
@@ -48439,7 +48346,7 @@
           <p:cNvPr id="4" name="Content Placeholder 3">
             <a:extLst>
               <a:ext uri="{FF2B5EF4-FFF2-40B4-BE49-F238E27FC236}">
-                <a16:creationId xmlns:a16="http://schemas.microsoft.com/office/drawing/2014/main" id="{463411C6-A138-7B7D-56F9-51D612ABD3A0}"/>
+                <a16:creationId xmlns:a16="http://schemas.microsoft.com/office/drawing/2014/main" id="{9A85F99E-ADF7-F268-6883-D55A7535720A}"/>
               </a:ext>
             </a:extLst>
           </p:cNvPr>
@@ -48455,83 +48362,110 @@
           <a:bodyPr/>
           <a:lstStyle/>
           <a:p>
-            <a:pPr>
-              <a:spcBef>
-                <a:spcPts val="600"/>
-              </a:spcBef>
-              <a:spcAft>
-                <a:spcPts val="600"/>
-              </a:spcAft>
-              <a:buFont typeface="Wingdings" panose="05000000000000000000" pitchFamily="2" charset="2"/>
-              <a:buChar char="Ø"/>
+            <a:r>
+              <a:rPr lang="en-CA" dirty="0"/>
+              <a:t>Why choose Microsoft Azure, not AWS, Google AI or other service providers?</a:t>
+            </a:r>
+          </a:p>
+          <a:p>
+            <a:pPr lvl="1"/>
+            <a:r>
+              <a:rPr lang="en-CA" dirty="0"/>
+              <a:t>We have subscriptions with Microsoft Azure</a:t>
+            </a:r>
+          </a:p>
+          <a:p>
+            <a:r>
+              <a:rPr lang="en-US" dirty="0"/>
+              <a:t>Is that safe to let Azure Language Cognitive Service to digest my documents and scripts?</a:t>
+            </a:r>
+          </a:p>
+          <a:p>
+            <a:pPr lvl="1"/>
+            <a:r>
+              <a:rPr lang="en-US" dirty="0"/>
+              <a:t>Yes, those are user materials.</a:t>
+            </a:r>
+          </a:p>
+          <a:p>
+            <a:r>
+              <a:rPr lang="en-US" dirty="0"/>
+              <a:t>Can I use it in other products?</a:t>
+            </a:r>
+          </a:p>
+          <a:p>
+            <a:pPr lvl="1"/>
+            <a:r>
+              <a:rPr lang="en-US" dirty="0"/>
+              <a:t>Yes, the core is NuGet packaged and can be easily adapted to any products.</a:t>
+            </a:r>
+          </a:p>
+          <a:p>
+            <a:r>
+              <a:rPr lang="en-US" dirty="0"/>
+              <a:t>Can I ask using a different language and get answers in that language?</a:t>
+            </a:r>
+          </a:p>
+          <a:p>
+            <a:pPr lvl="1"/>
+            <a:r>
+              <a:rPr lang="en-US" dirty="0"/>
+              <a:t>Yes, feasible with Azure Language Translation service</a:t>
+            </a:r>
+          </a:p>
+          <a:p>
+            <a:r>
+              <a:rPr lang="en-US" dirty="0"/>
+              <a:t>Is that expensive to use the Azure Blob Storage service?</a:t>
+            </a:r>
+          </a:p>
+          <a:p>
+            <a:pPr lvl="1"/>
+            <a:r>
+              <a:rPr lang="en-US"/>
+              <a:t>No</a:t>
+            </a:r>
+            <a:endParaRPr lang="en-US" dirty="0"/>
+          </a:p>
+          <a:p>
+            <a:r>
+              <a:rPr lang="en-US" dirty="0"/>
+              <a:t>Is that expensive to use the Azure Language Cognitive Service?</a:t>
+            </a:r>
+          </a:p>
+          <a:p>
+            <a:pPr lvl="1"/>
+            <a:r>
+              <a:rPr lang="en-US" dirty="0"/>
+              <a:t>Depends on the service call volume, in my experiment: $0/m(F0) or ~$40/m (S1) for 18M document training and querying. The tier is controllable.</a:t>
+            </a:r>
+          </a:p>
+          <a:p>
+            <a:pPr lvl="1"/>
+            <a:r>
+              <a:rPr lang="en-US" dirty="0"/>
+              <a:t>Projecting in production ~$100/m for one product</a:t>
+            </a:r>
+          </a:p>
+          <a:p>
+            <a:pPr lvl="1"/>
+            <a:r>
+              <a:rPr lang="en-US" dirty="0"/>
+              <a:t>Comparing tons of subscription credits are wasted, this is just a tiny fraction of the expenses.</a:t>
+            </a:r>
+          </a:p>
+          <a:p>
+            <a:pPr marL="0" indent="0">
+              <a:buNone/>
             </a:pPr>
-            <a:r>
-              <a:rPr lang="en-US" dirty="0"/>
-              <a:t>I want to ask question in my own language</a:t>
-            </a:r>
-          </a:p>
-          <a:p>
-            <a:pPr>
-              <a:spcBef>
-                <a:spcPts val="600"/>
-              </a:spcBef>
-              <a:spcAft>
-                <a:spcPts val="600"/>
-              </a:spcAft>
-              <a:buFont typeface="Wingdings" panose="05000000000000000000" pitchFamily="2" charset="2"/>
-              <a:buChar char="Ø"/>
-            </a:pPr>
-            <a:r>
-              <a:rPr lang="en-US" dirty="0"/>
-              <a:t>I want to have the answer in my own language</a:t>
-            </a:r>
-          </a:p>
-          <a:p>
-            <a:pPr>
-              <a:spcBef>
-                <a:spcPts val="600"/>
-              </a:spcBef>
-              <a:spcAft>
-                <a:spcPts val="600"/>
-              </a:spcAft>
-              <a:buFont typeface="Wingdings" panose="05000000000000000000" pitchFamily="2" charset="2"/>
-              <a:buChar char="Ø"/>
-            </a:pPr>
-            <a:r>
-              <a:rPr lang="en-US" dirty="0"/>
-              <a:t>I want to ask Chatbot to generate a script for me</a:t>
-            </a:r>
-          </a:p>
-          <a:p>
-            <a:pPr>
-              <a:spcBef>
-                <a:spcPts val="600"/>
-              </a:spcBef>
-              <a:spcAft>
-                <a:spcPts val="600"/>
-              </a:spcAft>
-              <a:buFont typeface="Wingdings" panose="05000000000000000000" pitchFamily="2" charset="2"/>
-              <a:buChar char="Ø"/>
-            </a:pPr>
-            <a:r>
-              <a:rPr lang="en-US" dirty="0"/>
-              <a:t>I want to ask Chatbot to revise generated script with </a:t>
-            </a:r>
-            <a:r>
-              <a:rPr lang="en-US"/>
-              <a:t>some prompts</a:t>
-            </a:r>
             <a:endParaRPr lang="en-US" dirty="0"/>
-          </a:p>
-          <a:p>
-            <a:endParaRPr lang="en-CA" dirty="0"/>
           </a:p>
         </p:txBody>
       </p:sp>
     </p:spTree>
     <p:extLst>
       <p:ext uri="{BB962C8B-B14F-4D97-AF65-F5344CB8AC3E}">
-        <p14:creationId xmlns:p14="http://schemas.microsoft.com/office/powerpoint/2010/main" val="1455857299"/>
+        <p14:creationId xmlns:p14="http://schemas.microsoft.com/office/powerpoint/2010/main" val="3147653832"/>
       </p:ext>
     </p:extLst>
   </p:cSld>
@@ -48563,7 +48497,7 @@
           <p:cNvPr id="2" name="Text Placeholder 1">
             <a:extLst>
               <a:ext uri="{FF2B5EF4-FFF2-40B4-BE49-F238E27FC236}">
-                <a16:creationId xmlns:a16="http://schemas.microsoft.com/office/drawing/2014/main" id="{59319340-3D40-4017-AE96-227E1D8E232D}"/>
+                <a16:creationId xmlns:a16="http://schemas.microsoft.com/office/drawing/2014/main" id="{CC5500BF-795A-6927-7D6C-99DB2E4C81C0}"/>
               </a:ext>
             </a:extLst>
           </p:cNvPr>
@@ -48571,7 +48505,7 @@
             <a:spLocks noGrp="1"/>
           </p:cNvSpPr>
           <p:nvPr>
-            <p:ph type="body" sz="quarter" idx="13"/>
+            <p:ph type="body" sz="quarter" idx="20"/>
           </p:nvPr>
         </p:nvSpPr>
         <p:spPr/>
@@ -48579,16 +48513,16 @@
           <a:bodyPr/>
           <a:lstStyle/>
           <a:p>
-            <a:endParaRPr lang="en-US"/>
+            <a:endParaRPr lang="en-CA"/>
           </a:p>
         </p:txBody>
       </p:sp>
       <p:sp>
         <p:nvSpPr>
-          <p:cNvPr id="3" name="Text Placeholder 2">
+          <p:cNvPr id="3" name="Title 2">
             <a:extLst>
               <a:ext uri="{FF2B5EF4-FFF2-40B4-BE49-F238E27FC236}">
-                <a16:creationId xmlns:a16="http://schemas.microsoft.com/office/drawing/2014/main" id="{A62E9BA5-CFFC-4654-83F4-9C29111AEBE4}"/>
+                <a16:creationId xmlns:a16="http://schemas.microsoft.com/office/drawing/2014/main" id="{B1266E83-D9FE-3A67-6C93-987BCDAA984E}"/>
               </a:ext>
             </a:extLst>
           </p:cNvPr>
@@ -48596,7 +48530,7 @@
             <a:spLocks noGrp="1"/>
           </p:cNvSpPr>
           <p:nvPr>
-            <p:ph type="body" sz="quarter" idx="11"/>
+            <p:ph type="title"/>
           </p:nvPr>
         </p:nvSpPr>
         <p:spPr/>
@@ -48606,15 +48540,110 @@
           <a:p>
             <a:r>
               <a:rPr lang="en-US" dirty="0"/>
-              <a:t>Thank you!</a:t>
-            </a:r>
+              <a:t>Extend Check List</a:t>
+            </a:r>
+            <a:endParaRPr lang="en-CA" dirty="0"/>
+          </a:p>
+        </p:txBody>
+      </p:sp>
+      <p:sp>
+        <p:nvSpPr>
+          <p:cNvPr id="4" name="Content Placeholder 3">
+            <a:extLst>
+              <a:ext uri="{FF2B5EF4-FFF2-40B4-BE49-F238E27FC236}">
+                <a16:creationId xmlns:a16="http://schemas.microsoft.com/office/drawing/2014/main" id="{463411C6-A138-7B7D-56F9-51D612ABD3A0}"/>
+              </a:ext>
+            </a:extLst>
+          </p:cNvPr>
+          <p:cNvSpPr>
+            <a:spLocks noGrp="1"/>
+          </p:cNvSpPr>
+          <p:nvPr>
+            <p:ph sz="quarter" idx="21"/>
+          </p:nvPr>
+        </p:nvSpPr>
+        <p:spPr/>
+        <p:txBody>
+          <a:bodyPr/>
+          <a:lstStyle/>
+          <a:p>
+            <a:pPr>
+              <a:spcBef>
+                <a:spcPts val="600"/>
+              </a:spcBef>
+              <a:spcAft>
+                <a:spcPts val="600"/>
+              </a:spcAft>
+              <a:buFont typeface="Wingdings" panose="05000000000000000000" pitchFamily="2" charset="2"/>
+              <a:buChar char="Ø"/>
+            </a:pPr>
+            <a:r>
+              <a:rPr lang="en-US" dirty="0"/>
+              <a:t>I want to ask question in my own language</a:t>
+            </a:r>
+          </a:p>
+          <a:p>
+            <a:pPr>
+              <a:spcBef>
+                <a:spcPts val="600"/>
+              </a:spcBef>
+              <a:spcAft>
+                <a:spcPts val="600"/>
+              </a:spcAft>
+              <a:buFont typeface="Wingdings" panose="05000000000000000000" pitchFamily="2" charset="2"/>
+              <a:buChar char="Ø"/>
+            </a:pPr>
+            <a:r>
+              <a:rPr lang="en-US" dirty="0"/>
+              <a:t>I want to have the answer in my own language</a:t>
+            </a:r>
+          </a:p>
+          <a:p>
+            <a:pPr>
+              <a:spcBef>
+                <a:spcPts val="600"/>
+              </a:spcBef>
+              <a:spcAft>
+                <a:spcPts val="600"/>
+              </a:spcAft>
+              <a:buFont typeface="Wingdings" panose="05000000000000000000" pitchFamily="2" charset="2"/>
+              <a:buChar char="Ø"/>
+            </a:pPr>
+            <a:r>
+              <a:rPr lang="en-US" dirty="0"/>
+              <a:t>I want to ask Chatbot to generate a script for me</a:t>
+            </a:r>
+          </a:p>
+          <a:p>
+            <a:pPr>
+              <a:spcBef>
+                <a:spcPts val="600"/>
+              </a:spcBef>
+              <a:spcAft>
+                <a:spcPts val="600"/>
+              </a:spcAft>
+              <a:buFont typeface="Wingdings" panose="05000000000000000000" pitchFamily="2" charset="2"/>
+              <a:buChar char="Ø"/>
+            </a:pPr>
+            <a:r>
+              <a:rPr lang="en-US" dirty="0"/>
+              <a:t>I want to ask Chatbot to revise generated script with </a:t>
+            </a:r>
+            <a:r>
+              <a:rPr lang="en-US"/>
+              <a:t>some prompts</a:t>
+            </a:r>
+            <a:endParaRPr lang="en-US" dirty="0"/>
+          </a:p>
+          <a:p>
+            <a:endParaRPr lang="en-CA" dirty="0"/>
           </a:p>
         </p:txBody>
       </p:sp>
     </p:spTree>
     <p:extLst>
       <p:ext uri="{BB962C8B-B14F-4D97-AF65-F5344CB8AC3E}">
-        <p14:creationId xmlns:p14="http://schemas.microsoft.com/office/powerpoint/2010/main" val="1343674845"/>
+        <p14:creationId xmlns:p14="http://schemas.microsoft.com/office/powerpoint/2010/main" val="1455857299"/>
       </p:ext>
     </p:extLst>
   </p:cSld>
@@ -49659,21 +49688,6 @@
 </file>
 
 <file path=customXml/item1.xml><?xml version="1.0" encoding="utf-8"?>
-<p:properties xmlns:p="http://schemas.microsoft.com/office/2006/metadata/properties" xmlns:xsi="http://www.w3.org/2001/XMLSchema-instance" xmlns:pc="http://schemas.microsoft.com/office/infopath/2007/PartnerControls">
-  <documentManagement/>
-</p:properties>
-</file>
-
-<file path=customXml/item2.xml><?xml version="1.0" encoding="utf-8"?>
-<?mso-contentType ?>
-<FormTemplates xmlns="http://schemas.microsoft.com/sharepoint/v3/contenttype/forms">
-  <Display>DocumentLibraryForm</Display>
-  <Edit>DocumentLibraryForm</Edit>
-  <New>DocumentLibraryForm</New>
-</FormTemplates>
-</file>
-
-<file path=customXml/item3.xml><?xml version="1.0" encoding="utf-8"?>
 <ct:contentTypeSchema xmlns:ct="http://schemas.microsoft.com/office/2006/metadata/contentType" xmlns:ma="http://schemas.microsoft.com/office/2006/metadata/properties/metaAttributes" ct:_="" ma:_="" ma:contentTypeName="Dokument" ma:contentTypeID="0x010100610F89A0BBA6C34A913DB646AC567109" ma:contentTypeVersion="12" ma:contentTypeDescription="Ein neues Dokument erstellen." ma:contentTypeScope="" ma:versionID="b3371b258f4be0ddf951ea065973cc30">
   <xsd:schema xmlns:xsd="http://www.w3.org/2001/XMLSchema" xmlns:xs="http://www.w3.org/2001/XMLSchema" xmlns:p="http://schemas.microsoft.com/office/2006/metadata/properties" xmlns:ns2="1f6a6638-2655-4a74-b9f8-16c1b5edccac" xmlns:ns3="bf34d6df-5183-4f9f-a1bd-e8af6fdd30b8" targetNamespace="http://schemas.microsoft.com/office/2006/metadata/properties" ma:root="true" ma:fieldsID="375e732f81423a44c24ef989eb02442f" ns2:_="" ns3:_="">
     <xsd:import namespace="1f6a6638-2655-4a74-b9f8-16c1b5edccac"/>
@@ -49890,25 +49904,22 @@
 </ct:contentTypeSchema>
 </file>
 
-<file path=customXml/itemProps1.xml><?xml version="1.0" encoding="utf-8"?>
-<ds:datastoreItem xmlns:ds="http://schemas.openxmlformats.org/officeDocument/2006/customXml" ds:itemID="{97794DA4-B143-4F60-BF7C-EA867C43D1FE}">
-  <ds:schemaRefs>
-    <ds:schemaRef ds:uri="http://schemas.microsoft.com/office/2006/metadata/properties"/>
-    <ds:schemaRef ds:uri="http://schemas.microsoft.com/office/infopath/2007/PartnerControls"/>
-    <ds:schemaRef ds:uri="d62b6ecb-acff-4b24-a527-ff2b271ebe71"/>
-  </ds:schemaRefs>
-</ds:datastoreItem>
+<file path=customXml/item2.xml><?xml version="1.0" encoding="utf-8"?>
+<?mso-contentType ?>
+<FormTemplates xmlns="http://schemas.microsoft.com/sharepoint/v3/contenttype/forms">
+  <Display>DocumentLibraryForm</Display>
+  <Edit>DocumentLibraryForm</Edit>
+  <New>DocumentLibraryForm</New>
+</FormTemplates>
 </file>
 
-<file path=customXml/itemProps2.xml><?xml version="1.0" encoding="utf-8"?>
-<ds:datastoreItem xmlns:ds="http://schemas.openxmlformats.org/officeDocument/2006/customXml" ds:itemID="{6543A033-2779-4EB5-82E0-EE769341BA7A}">
-  <ds:schemaRefs>
-    <ds:schemaRef ds:uri="http://schemas.microsoft.com/sharepoint/v3/contenttype/forms"/>
-  </ds:schemaRefs>
-</ds:datastoreItem>
+<file path=customXml/item3.xml><?xml version="1.0" encoding="utf-8"?>
+<p:properties xmlns:p="http://schemas.microsoft.com/office/2006/metadata/properties" xmlns:xsi="http://www.w3.org/2001/XMLSchema-instance" xmlns:pc="http://schemas.microsoft.com/office/infopath/2007/PartnerControls">
+  <documentManagement/>
+</p:properties>
 </file>
 
-<file path=customXml/itemProps3.xml><?xml version="1.0" encoding="utf-8"?>
+<file path=customXml/itemProps1.xml><?xml version="1.0" encoding="utf-8"?>
 <ds:datastoreItem xmlns:ds="http://schemas.openxmlformats.org/officeDocument/2006/customXml" ds:itemID="{CCCB94B5-2582-4AC7-85D8-612CAD4FD0C1}">
   <ds:schemaRefs>
     <ds:schemaRef ds:uri="http://schemas.microsoft.com/office/2006/metadata/contentType"/>
@@ -49925,4 +49936,22 @@
     <ds:schemaRef ds:uri="http://schemas.microsoft.com/internal/obd"/>
   </ds:schemaRefs>
 </ds:datastoreItem>
+</file>
+
+<file path=customXml/itemProps2.xml><?xml version="1.0" encoding="utf-8"?>
+<ds:datastoreItem xmlns:ds="http://schemas.openxmlformats.org/officeDocument/2006/customXml" ds:itemID="{6543A033-2779-4EB5-82E0-EE769341BA7A}">
+  <ds:schemaRefs>
+    <ds:schemaRef ds:uri="http://schemas.microsoft.com/sharepoint/v3/contenttype/forms"/>
+  </ds:schemaRefs>
+</ds:datastoreItem>
+</file>
+
+<file path=customXml/itemProps3.xml><?xml version="1.0" encoding="utf-8"?>
+<ds:datastoreItem xmlns:ds="http://schemas.openxmlformats.org/officeDocument/2006/customXml" ds:itemID="{97794DA4-B143-4F60-BF7C-EA867C43D1FE}">
+  <ds:schemaRefs>
+    <ds:schemaRef ds:uri="http://schemas.microsoft.com/office/2006/metadata/properties"/>
+    <ds:schemaRef ds:uri="http://schemas.microsoft.com/office/infopath/2007/PartnerControls"/>
+    <ds:schemaRef ds:uri="d62b6ecb-acff-4b24-a527-ff2b271ebe71"/>
+  </ds:schemaRefs>
+</ds:datastoreItem>
 </file>
</xml_diff>